<commit_message>
uploaded the svr changes
</commit_message>
<xml_diff>
--- a/ImageSuperResolution.pptx
+++ b/ImageSuperResolution.pptx
@@ -18,9 +18,10 @@
     <p:sldId id="265" r:id="rId12"/>
     <p:sldId id="268" r:id="rId13"/>
     <p:sldId id="261" r:id="rId14"/>
-    <p:sldId id="269" r:id="rId15"/>
+    <p:sldId id="274" r:id="rId15"/>
     <p:sldId id="270" r:id="rId16"/>
-    <p:sldId id="259" r:id="rId17"/>
+    <p:sldId id="269" r:id="rId17"/>
+    <p:sldId id="259" r:id="rId18"/>
   </p:sldIdLst>
   <p:sldSz cx="12192000" cy="6858000"/>
   <p:notesSz cx="6858000" cy="9144000"/>
@@ -3209,7 +3210,7 @@
 </file>
 
 <file path=ppt/slideLayouts/slideLayout10.xml><?xml version="1.0" encoding="utf-8"?>
-<p:sldLayout xmlns:a="http://schemas.openxmlformats.org/drawingml/2006/main" xmlns:r="http://schemas.openxmlformats.org/officeDocument/2006/relationships" xmlns:p="http://schemas.openxmlformats.org/presentationml/2006/main" preserve="1">
+<p:sldLayout xmlns:a="http://schemas.openxmlformats.org/drawingml/2006/main" xmlns:r="http://schemas.openxmlformats.org/officeDocument/2006/relationships" xmlns:p="http://schemas.openxmlformats.org/presentationml/2006/main" showMasterSp="0" preserve="1">
   <p:cSld name="Panoramic Picture with Caption">
     <p:spTree>
       <p:nvGrpSpPr>
@@ -3467,7 +3468,7 @@
 </file>
 
 <file path=ppt/slideLayouts/slideLayout11.xml><?xml version="1.0" encoding="utf-8"?>
-<p:sldLayout xmlns:a="http://schemas.openxmlformats.org/drawingml/2006/main" xmlns:r="http://schemas.openxmlformats.org/officeDocument/2006/relationships" xmlns:p="http://schemas.openxmlformats.org/presentationml/2006/main" preserve="1">
+<p:sldLayout xmlns:a="http://schemas.openxmlformats.org/drawingml/2006/main" xmlns:r="http://schemas.openxmlformats.org/officeDocument/2006/relationships" xmlns:p="http://schemas.openxmlformats.org/presentationml/2006/main" showMasterSp="0" preserve="1">
   <p:cSld name="Title and Caption">
     <p:spTree>
       <p:nvGrpSpPr>
@@ -3714,7 +3715,7 @@
 </file>
 
 <file path=ppt/slideLayouts/slideLayout12.xml><?xml version="1.0" encoding="utf-8"?>
-<p:sldLayout xmlns:a="http://schemas.openxmlformats.org/drawingml/2006/main" xmlns:r="http://schemas.openxmlformats.org/officeDocument/2006/relationships" xmlns:p="http://schemas.openxmlformats.org/presentationml/2006/main" preserve="1">
+<p:sldLayout xmlns:a="http://schemas.openxmlformats.org/drawingml/2006/main" xmlns:r="http://schemas.openxmlformats.org/officeDocument/2006/relationships" xmlns:p="http://schemas.openxmlformats.org/presentationml/2006/main" showMasterSp="0" preserve="1">
   <p:cSld name="Quote with Caption">
     <p:spTree>
       <p:nvGrpSpPr>
@@ -4087,7 +4088,7 @@
 </file>
 
 <file path=ppt/slideLayouts/slideLayout13.xml><?xml version="1.0" encoding="utf-8"?>
-<p:sldLayout xmlns:a="http://schemas.openxmlformats.org/drawingml/2006/main" xmlns:r="http://schemas.openxmlformats.org/officeDocument/2006/relationships" xmlns:p="http://schemas.openxmlformats.org/presentationml/2006/main" preserve="1">
+<p:sldLayout xmlns:a="http://schemas.openxmlformats.org/drawingml/2006/main" xmlns:r="http://schemas.openxmlformats.org/officeDocument/2006/relationships" xmlns:p="http://schemas.openxmlformats.org/presentationml/2006/main" showMasterSp="0" preserve="1">
   <p:cSld name="Name Card">
     <p:spTree>
       <p:nvGrpSpPr>
@@ -4334,7 +4335,7 @@
 </file>
 
 <file path=ppt/slideLayouts/slideLayout14.xml><?xml version="1.0" encoding="utf-8"?>
-<p:sldLayout xmlns:a="http://schemas.openxmlformats.org/drawingml/2006/main" xmlns:r="http://schemas.openxmlformats.org/officeDocument/2006/relationships" xmlns:p="http://schemas.openxmlformats.org/presentationml/2006/main" preserve="1">
+<p:sldLayout xmlns:a="http://schemas.openxmlformats.org/drawingml/2006/main" xmlns:r="http://schemas.openxmlformats.org/officeDocument/2006/relationships" xmlns:p="http://schemas.openxmlformats.org/presentationml/2006/main" showMasterSp="0" preserve="1">
   <p:cSld name="Quote Name Card">
     <p:spTree>
       <p:nvGrpSpPr>
@@ -4701,7 +4702,7 @@
 </file>
 
 <file path=ppt/slideLayouts/slideLayout15.xml><?xml version="1.0" encoding="utf-8"?>
-<p:sldLayout xmlns:a="http://schemas.openxmlformats.org/drawingml/2006/main" xmlns:r="http://schemas.openxmlformats.org/officeDocument/2006/relationships" xmlns:p="http://schemas.openxmlformats.org/presentationml/2006/main" preserve="1">
+<p:sldLayout xmlns:a="http://schemas.openxmlformats.org/drawingml/2006/main" xmlns:r="http://schemas.openxmlformats.org/officeDocument/2006/relationships" xmlns:p="http://schemas.openxmlformats.org/presentationml/2006/main" showMasterSp="0" preserve="1">
   <p:cSld name="True or False">
     <p:spTree>
       <p:nvGrpSpPr>
@@ -4997,7 +4998,7 @@
 </file>
 
 <file path=ppt/slideLayouts/slideLayout16.xml><?xml version="1.0" encoding="utf-8"?>
-<p:sldLayout xmlns:a="http://schemas.openxmlformats.org/drawingml/2006/main" xmlns:r="http://schemas.openxmlformats.org/officeDocument/2006/relationships" xmlns:p="http://schemas.openxmlformats.org/presentationml/2006/main" type="vertTx" preserve="1">
+<p:sldLayout xmlns:a="http://schemas.openxmlformats.org/drawingml/2006/main" xmlns:r="http://schemas.openxmlformats.org/officeDocument/2006/relationships" xmlns:p="http://schemas.openxmlformats.org/presentationml/2006/main" showMasterSp="0" type="vertTx" preserve="1">
   <p:cSld name="Title and Vertical Text">
     <p:spTree>
       <p:nvGrpSpPr>
@@ -5168,7 +5169,7 @@
 </file>
 
 <file path=ppt/slideLayouts/slideLayout17.xml><?xml version="1.0" encoding="utf-8"?>
-<p:sldLayout xmlns:a="http://schemas.openxmlformats.org/drawingml/2006/main" xmlns:r="http://schemas.openxmlformats.org/officeDocument/2006/relationships" xmlns:p="http://schemas.openxmlformats.org/presentationml/2006/main" type="vertTitleAndTx" preserve="1">
+<p:sldLayout xmlns:a="http://schemas.openxmlformats.org/drawingml/2006/main" xmlns:r="http://schemas.openxmlformats.org/officeDocument/2006/relationships" xmlns:p="http://schemas.openxmlformats.org/presentationml/2006/main" showMasterSp="0" type="vertTitleAndTx" preserve="1">
   <p:cSld name="Vertical Title and Text">
     <p:spTree>
       <p:nvGrpSpPr>
@@ -5345,7 +5346,7 @@
 </file>
 
 <file path=ppt/slideLayouts/slideLayout2.xml><?xml version="1.0" encoding="utf-8"?>
-<p:sldLayout xmlns:a="http://schemas.openxmlformats.org/drawingml/2006/main" xmlns:r="http://schemas.openxmlformats.org/officeDocument/2006/relationships" xmlns:p="http://schemas.openxmlformats.org/presentationml/2006/main" type="obj" preserve="1">
+<p:sldLayout xmlns:a="http://schemas.openxmlformats.org/drawingml/2006/main" xmlns:r="http://schemas.openxmlformats.org/officeDocument/2006/relationships" xmlns:p="http://schemas.openxmlformats.org/presentationml/2006/main" showMasterSp="0" type="obj" preserve="1">
   <p:cSld name="Title and Content">
     <p:spTree>
       <p:nvGrpSpPr>
@@ -5512,7 +5513,7 @@
 </file>
 
 <file path=ppt/slideLayouts/slideLayout3.xml><?xml version="1.0" encoding="utf-8"?>
-<p:sldLayout xmlns:a="http://schemas.openxmlformats.org/drawingml/2006/main" xmlns:r="http://schemas.openxmlformats.org/officeDocument/2006/relationships" xmlns:p="http://schemas.openxmlformats.org/presentationml/2006/main" type="secHead" preserve="1">
+<p:sldLayout xmlns:a="http://schemas.openxmlformats.org/drawingml/2006/main" xmlns:r="http://schemas.openxmlformats.org/officeDocument/2006/relationships" xmlns:p="http://schemas.openxmlformats.org/presentationml/2006/main" showMasterSp="0" type="secHead" preserve="1">
   <p:cSld name="Section Header">
     <p:spTree>
       <p:nvGrpSpPr>
@@ -5759,7 +5760,7 @@
 </file>
 
 <file path=ppt/slideLayouts/slideLayout4.xml><?xml version="1.0" encoding="utf-8"?>
-<p:sldLayout xmlns:a="http://schemas.openxmlformats.org/drawingml/2006/main" xmlns:r="http://schemas.openxmlformats.org/officeDocument/2006/relationships" xmlns:p="http://schemas.openxmlformats.org/presentationml/2006/main" type="twoObj" preserve="1">
+<p:sldLayout xmlns:a="http://schemas.openxmlformats.org/drawingml/2006/main" xmlns:r="http://schemas.openxmlformats.org/officeDocument/2006/relationships" xmlns:p="http://schemas.openxmlformats.org/presentationml/2006/main" showMasterSp="0" type="twoObj" preserve="1">
   <p:cSld name="Two Content">
     <p:spTree>
       <p:nvGrpSpPr>
@@ -5992,7 +5993,7 @@
 </file>
 
 <file path=ppt/slideLayouts/slideLayout5.xml><?xml version="1.0" encoding="utf-8"?>
-<p:sldLayout xmlns:a="http://schemas.openxmlformats.org/drawingml/2006/main" xmlns:r="http://schemas.openxmlformats.org/officeDocument/2006/relationships" xmlns:p="http://schemas.openxmlformats.org/presentationml/2006/main" type="twoTxTwoObj" preserve="1">
+<p:sldLayout xmlns:a="http://schemas.openxmlformats.org/drawingml/2006/main" xmlns:r="http://schemas.openxmlformats.org/officeDocument/2006/relationships" xmlns:p="http://schemas.openxmlformats.org/presentationml/2006/main" showMasterSp="0" type="twoTxTwoObj" preserve="1">
   <p:cSld name="Comparison">
     <p:spTree>
       <p:nvGrpSpPr>
@@ -6371,7 +6372,7 @@
 </file>
 
 <file path=ppt/slideLayouts/slideLayout6.xml><?xml version="1.0" encoding="utf-8"?>
-<p:sldLayout xmlns:a="http://schemas.openxmlformats.org/drawingml/2006/main" xmlns:r="http://schemas.openxmlformats.org/officeDocument/2006/relationships" xmlns:p="http://schemas.openxmlformats.org/presentationml/2006/main" type="titleOnly" preserve="1">
+<p:sldLayout xmlns:a="http://schemas.openxmlformats.org/drawingml/2006/main" xmlns:r="http://schemas.openxmlformats.org/officeDocument/2006/relationships" xmlns:p="http://schemas.openxmlformats.org/presentationml/2006/main" showMasterSp="0" type="titleOnly" preserve="1">
   <p:cSld name="Title Only">
     <p:spTree>
       <p:nvGrpSpPr>
@@ -6486,7 +6487,7 @@
 </file>
 
 <file path=ppt/slideLayouts/slideLayout7.xml><?xml version="1.0" encoding="utf-8"?>
-<p:sldLayout xmlns:a="http://schemas.openxmlformats.org/drawingml/2006/main" xmlns:r="http://schemas.openxmlformats.org/officeDocument/2006/relationships" xmlns:p="http://schemas.openxmlformats.org/presentationml/2006/main" type="blank" preserve="1">
+<p:sldLayout xmlns:a="http://schemas.openxmlformats.org/drawingml/2006/main" xmlns:r="http://schemas.openxmlformats.org/officeDocument/2006/relationships" xmlns:p="http://schemas.openxmlformats.org/presentationml/2006/main" showMasterSp="0" type="blank" preserve="1">
   <p:cSld name="Blank">
     <p:spTree>
       <p:nvGrpSpPr>
@@ -6578,7 +6579,7 @@
 </file>
 
 <file path=ppt/slideLayouts/slideLayout8.xml><?xml version="1.0" encoding="utf-8"?>
-<p:sldLayout xmlns:a="http://schemas.openxmlformats.org/drawingml/2006/main" xmlns:r="http://schemas.openxmlformats.org/officeDocument/2006/relationships" xmlns:p="http://schemas.openxmlformats.org/presentationml/2006/main" type="objTx" preserve="1">
+<p:sldLayout xmlns:a="http://schemas.openxmlformats.org/drawingml/2006/main" xmlns:r="http://schemas.openxmlformats.org/officeDocument/2006/relationships" xmlns:p="http://schemas.openxmlformats.org/presentationml/2006/main" showMasterSp="0" type="objTx" preserve="1">
   <p:cSld name="Content with Caption">
     <p:spTree>
       <p:nvGrpSpPr>
@@ -6830,7 +6831,7 @@
 </file>
 
 <file path=ppt/slideLayouts/slideLayout9.xml><?xml version="1.0" encoding="utf-8"?>
-<p:sldLayout xmlns:a="http://schemas.openxmlformats.org/drawingml/2006/main" xmlns:r="http://schemas.openxmlformats.org/officeDocument/2006/relationships" xmlns:p="http://schemas.openxmlformats.org/presentationml/2006/main" type="picTx" preserve="1">
+<p:sldLayout xmlns:a="http://schemas.openxmlformats.org/drawingml/2006/main" xmlns:r="http://schemas.openxmlformats.org/officeDocument/2006/relationships" xmlns:p="http://schemas.openxmlformats.org/presentationml/2006/main" showMasterSp="0" type="picTx" preserve="1">
   <p:cSld name="Picture with Caption">
     <p:spTree>
       <p:nvGrpSpPr>
@@ -7970,7 +7971,7 @@
 </file>
 
 <file path=ppt/slides/slide1.xml><?xml version="1.0" encoding="utf-8"?>
-<p:sld xmlns:a="http://schemas.openxmlformats.org/drawingml/2006/main" xmlns:r="http://schemas.openxmlformats.org/officeDocument/2006/relationships" xmlns:p="http://schemas.openxmlformats.org/presentationml/2006/main">
+<p:sld xmlns:a="http://schemas.openxmlformats.org/drawingml/2006/main" xmlns:r="http://schemas.openxmlformats.org/officeDocument/2006/relationships" xmlns:p="http://schemas.openxmlformats.org/presentationml/2006/main" showMasterSp="0">
   <p:cSld>
     <p:spTree>
       <p:nvGrpSpPr>
@@ -8133,7 +8134,7 @@
 </file>
 
 <file path=ppt/slides/slide10.xml><?xml version="1.0" encoding="utf-8"?>
-<p:sld xmlns:a="http://schemas.openxmlformats.org/drawingml/2006/main" xmlns:r="http://schemas.openxmlformats.org/officeDocument/2006/relationships" xmlns:p="http://schemas.openxmlformats.org/presentationml/2006/main">
+<p:sld xmlns:a="http://schemas.openxmlformats.org/drawingml/2006/main" xmlns:r="http://schemas.openxmlformats.org/officeDocument/2006/relationships" xmlns:p="http://schemas.openxmlformats.org/presentationml/2006/main" showMasterSp="0">
   <p:cSld>
     <p:spTree>
       <p:nvGrpSpPr>
@@ -9154,7 +9155,7 @@
 </file>
 
 <file path=ppt/slides/slide11.xml><?xml version="1.0" encoding="utf-8"?>
-<p:sld xmlns:a="http://schemas.openxmlformats.org/drawingml/2006/main" xmlns:r="http://schemas.openxmlformats.org/officeDocument/2006/relationships" xmlns:p="http://schemas.openxmlformats.org/presentationml/2006/main">
+<p:sld xmlns:a="http://schemas.openxmlformats.org/drawingml/2006/main" xmlns:r="http://schemas.openxmlformats.org/officeDocument/2006/relationships" xmlns:p="http://schemas.openxmlformats.org/presentationml/2006/main" showMasterSp="0">
   <p:cSld>
     <p:spTree>
       <p:nvGrpSpPr>
@@ -9412,7 +9413,7 @@
 </file>
 
 <file path=ppt/slides/slide12.xml><?xml version="1.0" encoding="utf-8"?>
-<p:sld xmlns:a="http://schemas.openxmlformats.org/drawingml/2006/main" xmlns:r="http://schemas.openxmlformats.org/officeDocument/2006/relationships" xmlns:p="http://schemas.openxmlformats.org/presentationml/2006/main">
+<p:sld xmlns:a="http://schemas.openxmlformats.org/drawingml/2006/main" xmlns:r="http://schemas.openxmlformats.org/officeDocument/2006/relationships" xmlns:p="http://schemas.openxmlformats.org/presentationml/2006/main" showMasterSp="0">
   <p:cSld>
     <p:spTree>
       <p:nvGrpSpPr>
@@ -9670,7 +9671,7 @@
 </file>
 
 <file path=ppt/slides/slide13.xml><?xml version="1.0" encoding="utf-8"?>
-<p:sld xmlns:a="http://schemas.openxmlformats.org/drawingml/2006/main" xmlns:r="http://schemas.openxmlformats.org/officeDocument/2006/relationships" xmlns:p="http://schemas.openxmlformats.org/presentationml/2006/main">
+<p:sld xmlns:a="http://schemas.openxmlformats.org/drawingml/2006/main" xmlns:r="http://schemas.openxmlformats.org/officeDocument/2006/relationships" xmlns:p="http://schemas.openxmlformats.org/presentationml/2006/main" showMasterSp="0">
   <p:cSld>
     <p:spTree>
       <p:nvGrpSpPr>
@@ -10691,7 +10692,7 @@
 </file>
 
 <file path=ppt/slides/slide14.xml><?xml version="1.0" encoding="utf-8"?>
-<p:sld xmlns:a="http://schemas.openxmlformats.org/drawingml/2006/main" xmlns:r="http://schemas.openxmlformats.org/officeDocument/2006/relationships" xmlns:p="http://schemas.openxmlformats.org/presentationml/2006/main">
+<p:sld xmlns:a="http://schemas.openxmlformats.org/drawingml/2006/main" xmlns:r="http://schemas.openxmlformats.org/officeDocument/2006/relationships" xmlns:p="http://schemas.openxmlformats.org/presentationml/2006/main" showMasterSp="0">
   <p:cSld>
     <p:spTree>
       <p:nvGrpSpPr>
@@ -10707,10 +10708,450 @@
           <a:chExt cx="0" cy="0"/>
         </a:xfrm>
       </p:grpSpPr>
+      <p:pic>
+        <p:nvPicPr>
+          <p:cNvPr id="6" name="Picture 5">
+            <a:extLst>
+              <a:ext uri="{FF2B5EF4-FFF2-40B4-BE49-F238E27FC236}">
+                <a16:creationId xmlns:a16="http://schemas.microsoft.com/office/drawing/2014/main" id="{4465A770-44CB-42A0-9813-CD51A4714AE9}"/>
+              </a:ext>
+            </a:extLst>
+          </p:cNvPr>
+          <p:cNvPicPr>
+            <a:picLocks noChangeAspect="1"/>
+          </p:cNvPicPr>
+          <p:nvPr/>
+        </p:nvPicPr>
+        <p:blipFill>
+          <a:blip r:embed="rId2"/>
+          <a:stretch>
+            <a:fillRect/>
+          </a:stretch>
+        </p:blipFill>
+        <p:spPr>
+          <a:xfrm>
+            <a:off x="585049" y="226032"/>
+            <a:ext cx="3057525" cy="4581525"/>
+          </a:xfrm>
+          <a:prstGeom prst="rect">
+            <a:avLst/>
+          </a:prstGeom>
+        </p:spPr>
+      </p:pic>
+      <p:sp>
+        <p:nvSpPr>
+          <p:cNvPr id="7" name="TextBox 6">
+            <a:extLst>
+              <a:ext uri="{FF2B5EF4-FFF2-40B4-BE49-F238E27FC236}">
+                <a16:creationId xmlns:a16="http://schemas.microsoft.com/office/drawing/2014/main" id="{D214C1B0-228D-4736-9DC5-5930D89D0F87}"/>
+              </a:ext>
+            </a:extLst>
+          </p:cNvPr>
+          <p:cNvSpPr txBox="1"/>
+          <p:nvPr/>
+        </p:nvSpPr>
+        <p:spPr>
+          <a:xfrm>
+            <a:off x="681434" y="5064127"/>
+            <a:ext cx="3357769" cy="369332"/>
+          </a:xfrm>
+          <a:prstGeom prst="rect">
+            <a:avLst/>
+          </a:prstGeom>
+          <a:noFill/>
+        </p:spPr>
+        <p:txBody>
+          <a:bodyPr wrap="square" rtlCol="0">
+            <a:spAutoFit/>
+          </a:bodyPr>
+          <a:lstStyle/>
+          <a:p>
+            <a:r>
+              <a:rPr lang="en-US" dirty="0"/>
+              <a:t>HR IMAGE</a:t>
+            </a:r>
+          </a:p>
+        </p:txBody>
+      </p:sp>
+      <p:sp>
+        <p:nvSpPr>
+          <p:cNvPr id="8" name="TextBox 7">
+            <a:extLst>
+              <a:ext uri="{FF2B5EF4-FFF2-40B4-BE49-F238E27FC236}">
+                <a16:creationId xmlns:a16="http://schemas.microsoft.com/office/drawing/2014/main" id="{12695548-3E32-4CC6-9E32-C2494EF701FE}"/>
+              </a:ext>
+            </a:extLst>
+          </p:cNvPr>
+          <p:cNvSpPr txBox="1"/>
+          <p:nvPr/>
+        </p:nvSpPr>
+        <p:spPr>
+          <a:xfrm>
+            <a:off x="4183062" y="5027032"/>
+            <a:ext cx="3357769" cy="369332"/>
+          </a:xfrm>
+          <a:prstGeom prst="rect">
+            <a:avLst/>
+          </a:prstGeom>
+          <a:noFill/>
+        </p:spPr>
+        <p:txBody>
+          <a:bodyPr wrap="square" rtlCol="0">
+            <a:spAutoFit/>
+          </a:bodyPr>
+          <a:lstStyle/>
+          <a:p>
+            <a:r>
+              <a:rPr lang="en-US" dirty="0"/>
+              <a:t>INTERPOLATED IMAGE</a:t>
+            </a:r>
+          </a:p>
+        </p:txBody>
+      </p:sp>
+      <p:sp>
+        <p:nvSpPr>
+          <p:cNvPr id="9" name="TextBox 8">
+            <a:extLst>
+              <a:ext uri="{FF2B5EF4-FFF2-40B4-BE49-F238E27FC236}">
+                <a16:creationId xmlns:a16="http://schemas.microsoft.com/office/drawing/2014/main" id="{106A809E-B458-4D7F-A67C-2A826295628B}"/>
+              </a:ext>
+            </a:extLst>
+          </p:cNvPr>
+          <p:cNvSpPr txBox="1"/>
+          <p:nvPr/>
+        </p:nvSpPr>
+        <p:spPr>
+          <a:xfrm>
+            <a:off x="7737631" y="5064127"/>
+            <a:ext cx="3357769" cy="369332"/>
+          </a:xfrm>
+          <a:prstGeom prst="rect">
+            <a:avLst/>
+          </a:prstGeom>
+          <a:noFill/>
+        </p:spPr>
+        <p:txBody>
+          <a:bodyPr wrap="square" rtlCol="0">
+            <a:spAutoFit/>
+          </a:bodyPr>
+          <a:lstStyle/>
+          <a:p>
+            <a:r>
+              <a:rPr lang="en-US" dirty="0"/>
+              <a:t>PREDICTED IMAGE</a:t>
+            </a:r>
+          </a:p>
+        </p:txBody>
+      </p:sp>
+      <p:sp>
+        <p:nvSpPr>
+          <p:cNvPr id="10" name="TextBox 9">
+            <a:extLst>
+              <a:ext uri="{FF2B5EF4-FFF2-40B4-BE49-F238E27FC236}">
+                <a16:creationId xmlns:a16="http://schemas.microsoft.com/office/drawing/2014/main" id="{EF383E37-9C4A-47D6-98B0-41B5D0EB2C4E}"/>
+              </a:ext>
+            </a:extLst>
+          </p:cNvPr>
+          <p:cNvSpPr txBox="1"/>
+          <p:nvPr/>
+        </p:nvSpPr>
+        <p:spPr>
+          <a:xfrm>
+            <a:off x="681434" y="5524799"/>
+            <a:ext cx="2279560" cy="369332"/>
+          </a:xfrm>
+          <a:prstGeom prst="rect">
+            <a:avLst/>
+          </a:prstGeom>
+          <a:noFill/>
+        </p:spPr>
+        <p:txBody>
+          <a:bodyPr wrap="square" rtlCol="0">
+            <a:spAutoFit/>
+          </a:bodyPr>
+          <a:lstStyle/>
+          <a:p>
+            <a:r>
+              <a:rPr lang="en-IN" dirty="0"/>
+              <a:t>K = 2.5e3</a:t>
+            </a:r>
+          </a:p>
+        </p:txBody>
+      </p:sp>
+      <p:sp>
+        <p:nvSpPr>
+          <p:cNvPr id="11" name="TextBox 10">
+            <a:extLst>
+              <a:ext uri="{FF2B5EF4-FFF2-40B4-BE49-F238E27FC236}">
+                <a16:creationId xmlns:a16="http://schemas.microsoft.com/office/drawing/2014/main" id="{F747FF66-1357-40FB-BC46-3AA718090653}"/>
+              </a:ext>
+            </a:extLst>
+          </p:cNvPr>
+          <p:cNvSpPr txBox="1"/>
+          <p:nvPr/>
+        </p:nvSpPr>
+        <p:spPr>
+          <a:xfrm>
+            <a:off x="695606" y="5985471"/>
+            <a:ext cx="2279560" cy="369332"/>
+          </a:xfrm>
+          <a:prstGeom prst="rect">
+            <a:avLst/>
+          </a:prstGeom>
+          <a:noFill/>
+        </p:spPr>
+        <p:txBody>
+          <a:bodyPr wrap="square" rtlCol="0">
+            <a:spAutoFit/>
+          </a:bodyPr>
+          <a:lstStyle/>
+          <a:p>
+            <a:r>
+              <a:rPr lang="en-IN" dirty="0"/>
+              <a:t>PSNR MEAN : 22.74 </a:t>
+            </a:r>
+          </a:p>
+        </p:txBody>
+      </p:sp>
+      <p:sp>
+        <p:nvSpPr>
+          <p:cNvPr id="12" name="TextBox 11">
+            <a:extLst>
+              <a:ext uri="{FF2B5EF4-FFF2-40B4-BE49-F238E27FC236}">
+                <a16:creationId xmlns:a16="http://schemas.microsoft.com/office/drawing/2014/main" id="{346750B3-3948-4F54-8DCA-A432BB497E4E}"/>
+              </a:ext>
+            </a:extLst>
+          </p:cNvPr>
+          <p:cNvSpPr txBox="1"/>
+          <p:nvPr/>
+        </p:nvSpPr>
+        <p:spPr>
+          <a:xfrm>
+            <a:off x="7737631" y="5396364"/>
+            <a:ext cx="2279560" cy="369332"/>
+          </a:xfrm>
+          <a:prstGeom prst="rect">
+            <a:avLst/>
+          </a:prstGeom>
+          <a:noFill/>
+        </p:spPr>
+        <p:txBody>
+          <a:bodyPr wrap="square" rtlCol="0">
+            <a:spAutoFit/>
+          </a:bodyPr>
+          <a:lstStyle/>
+          <a:p>
+            <a:r>
+              <a:rPr lang="en-IN" dirty="0"/>
+              <a:t>PSNR : 19.28 </a:t>
+            </a:r>
+          </a:p>
+        </p:txBody>
+      </p:sp>
+      <p:sp>
+        <p:nvSpPr>
+          <p:cNvPr id="13" name="TextBox 12">
+            <a:extLst>
+              <a:ext uri="{FF2B5EF4-FFF2-40B4-BE49-F238E27FC236}">
+                <a16:creationId xmlns:a16="http://schemas.microsoft.com/office/drawing/2014/main" id="{77868FE0-C257-4093-B9E6-191E96AD1926}"/>
+              </a:ext>
+            </a:extLst>
+          </p:cNvPr>
+          <p:cNvSpPr txBox="1"/>
+          <p:nvPr/>
+        </p:nvSpPr>
+        <p:spPr>
+          <a:xfrm>
+            <a:off x="695606" y="6446143"/>
+            <a:ext cx="2279560" cy="369332"/>
+          </a:xfrm>
+          <a:prstGeom prst="rect">
+            <a:avLst/>
+          </a:prstGeom>
+          <a:noFill/>
+        </p:spPr>
+        <p:txBody>
+          <a:bodyPr wrap="square" rtlCol="0">
+            <a:spAutoFit/>
+          </a:bodyPr>
+          <a:lstStyle/>
+          <a:p>
+            <a:r>
+              <a:rPr lang="en-IN" dirty="0"/>
+              <a:t>PSNR Max : 24.54</a:t>
+            </a:r>
+          </a:p>
+        </p:txBody>
+      </p:sp>
+      <p:pic>
+        <p:nvPicPr>
+          <p:cNvPr id="4" name="Picture 3">
+            <a:extLst>
+              <a:ext uri="{FF2B5EF4-FFF2-40B4-BE49-F238E27FC236}">
+                <a16:creationId xmlns:a16="http://schemas.microsoft.com/office/drawing/2014/main" id="{EC1DD614-444F-4348-80D4-630319B2B24C}"/>
+              </a:ext>
+            </a:extLst>
+          </p:cNvPr>
+          <p:cNvPicPr>
+            <a:picLocks noChangeAspect="1"/>
+          </p:cNvPicPr>
+          <p:nvPr/>
+        </p:nvPicPr>
+        <p:blipFill>
+          <a:blip r:embed="rId3"/>
+          <a:stretch>
+            <a:fillRect/>
+          </a:stretch>
+        </p:blipFill>
+        <p:spPr>
+          <a:xfrm>
+            <a:off x="7493357" y="226032"/>
+            <a:ext cx="3057525" cy="4581525"/>
+          </a:xfrm>
+          <a:prstGeom prst="rect">
+            <a:avLst/>
+          </a:prstGeom>
+        </p:spPr>
+      </p:pic>
+      <p:pic>
+        <p:nvPicPr>
+          <p:cNvPr id="15" name="Picture 14">
+            <a:extLst>
+              <a:ext uri="{FF2B5EF4-FFF2-40B4-BE49-F238E27FC236}">
+                <a16:creationId xmlns:a16="http://schemas.microsoft.com/office/drawing/2014/main" id="{AC81B304-7409-4B05-A00D-DB96E643D32E}"/>
+              </a:ext>
+            </a:extLst>
+          </p:cNvPr>
+          <p:cNvPicPr>
+            <a:picLocks noChangeAspect="1"/>
+          </p:cNvPicPr>
+          <p:nvPr/>
+        </p:nvPicPr>
+        <p:blipFill>
+          <a:blip r:embed="rId4"/>
+          <a:stretch>
+            <a:fillRect/>
+          </a:stretch>
+        </p:blipFill>
+        <p:spPr>
+          <a:xfrm>
+            <a:off x="4039203" y="226032"/>
+            <a:ext cx="3057525" cy="4581525"/>
+          </a:xfrm>
+          <a:prstGeom prst="rect">
+            <a:avLst/>
+          </a:prstGeom>
+        </p:spPr>
+      </p:pic>
+      <p:sp>
+        <p:nvSpPr>
+          <p:cNvPr id="16" name="TextBox 15">
+            <a:extLst>
+              <a:ext uri="{FF2B5EF4-FFF2-40B4-BE49-F238E27FC236}">
+                <a16:creationId xmlns:a16="http://schemas.microsoft.com/office/drawing/2014/main" id="{6186BDAF-39D4-4567-AF41-5A139B267C8C}"/>
+              </a:ext>
+            </a:extLst>
+          </p:cNvPr>
+          <p:cNvSpPr txBox="1"/>
+          <p:nvPr/>
+        </p:nvSpPr>
+        <p:spPr>
+          <a:xfrm>
+            <a:off x="3361855" y="6368631"/>
+            <a:ext cx="2279560" cy="369332"/>
+          </a:xfrm>
+          <a:prstGeom prst="rect">
+            <a:avLst/>
+          </a:prstGeom>
+          <a:noFill/>
+        </p:spPr>
+        <p:txBody>
+          <a:bodyPr wrap="square" rtlCol="0">
+            <a:spAutoFit/>
+          </a:bodyPr>
+          <a:lstStyle/>
+          <a:p>
+            <a:r>
+              <a:rPr lang="en-IN" dirty="0"/>
+              <a:t>Patch Size = 5x5</a:t>
+            </a:r>
+          </a:p>
+        </p:txBody>
+      </p:sp>
+      <p:sp>
+        <p:nvSpPr>
+          <p:cNvPr id="17" name="TextBox 16">
+            <a:extLst>
+              <a:ext uri="{FF2B5EF4-FFF2-40B4-BE49-F238E27FC236}">
+                <a16:creationId xmlns:a16="http://schemas.microsoft.com/office/drawing/2014/main" id="{7B853001-1F88-403F-AF4F-DFCD7EC6C865}"/>
+              </a:ext>
+            </a:extLst>
+          </p:cNvPr>
+          <p:cNvSpPr txBox="1"/>
+          <p:nvPr/>
+        </p:nvSpPr>
+        <p:spPr>
+          <a:xfrm>
+            <a:off x="5627335" y="6342365"/>
+            <a:ext cx="2279560" cy="369332"/>
+          </a:xfrm>
+          <a:prstGeom prst="rect">
+            <a:avLst/>
+          </a:prstGeom>
+          <a:noFill/>
+        </p:spPr>
+        <p:txBody>
+          <a:bodyPr wrap="square" rtlCol="0">
+            <a:spAutoFit/>
+          </a:bodyPr>
+          <a:lstStyle/>
+          <a:p>
+            <a:r>
+              <a:rPr lang="en-IN" dirty="0"/>
+              <a:t>Epsilon=0.2 </a:t>
+            </a:r>
+          </a:p>
+        </p:txBody>
+      </p:sp>
+      <p:sp>
+        <p:nvSpPr>
+          <p:cNvPr id="18" name="TextBox 17">
+            <a:extLst>
+              <a:ext uri="{FF2B5EF4-FFF2-40B4-BE49-F238E27FC236}">
+                <a16:creationId xmlns:a16="http://schemas.microsoft.com/office/drawing/2014/main" id="{C69679B5-985F-43D2-994F-C588E16D640B}"/>
+              </a:ext>
+            </a:extLst>
+          </p:cNvPr>
+          <p:cNvSpPr txBox="1"/>
+          <p:nvPr/>
+        </p:nvSpPr>
+        <p:spPr>
+          <a:xfrm>
+            <a:off x="7606651" y="6316099"/>
+            <a:ext cx="2279560" cy="369332"/>
+          </a:xfrm>
+          <a:prstGeom prst="rect">
+            <a:avLst/>
+          </a:prstGeom>
+          <a:noFill/>
+        </p:spPr>
+        <p:txBody>
+          <a:bodyPr wrap="square" rtlCol="0">
+            <a:spAutoFit/>
+          </a:bodyPr>
+          <a:lstStyle/>
+          <a:p>
+            <a:r>
+              <a:rPr lang="en-IN" dirty="0"/>
+              <a:t>C=362 </a:t>
+            </a:r>
+          </a:p>
+        </p:txBody>
+      </p:sp>
     </p:spTree>
     <p:extLst>
       <p:ext uri="{BB962C8B-B14F-4D97-AF65-F5344CB8AC3E}">
-        <p14:creationId xmlns:p14="http://schemas.microsoft.com/office/powerpoint/2010/main" val="2162204368"/>
+        <p14:creationId xmlns:p14="http://schemas.microsoft.com/office/powerpoint/2010/main" val="758423097"/>
       </p:ext>
     </p:extLst>
   </p:cSld>
@@ -10721,7 +11162,7 @@
 </file>
 
 <file path=ppt/slides/slide15.xml><?xml version="1.0" encoding="utf-8"?>
-<p:sld xmlns:a="http://schemas.openxmlformats.org/drawingml/2006/main" xmlns:r="http://schemas.openxmlformats.org/officeDocument/2006/relationships" xmlns:p="http://schemas.openxmlformats.org/presentationml/2006/main">
+<p:sld xmlns:a="http://schemas.openxmlformats.org/drawingml/2006/main" xmlns:r="http://schemas.openxmlformats.org/officeDocument/2006/relationships" xmlns:p="http://schemas.openxmlformats.org/presentationml/2006/main" showMasterSp="0">
   <p:cSld>
     <p:spTree>
       <p:nvGrpSpPr>
@@ -10737,6 +11178,446 @@
           <a:chExt cx="0" cy="0"/>
         </a:xfrm>
       </p:grpSpPr>
+      <p:pic>
+        <p:nvPicPr>
+          <p:cNvPr id="3" name="Picture 2">
+            <a:extLst>
+              <a:ext uri="{FF2B5EF4-FFF2-40B4-BE49-F238E27FC236}">
+                <a16:creationId xmlns:a16="http://schemas.microsoft.com/office/drawing/2014/main" id="{59094770-BF03-4C9A-9AF5-475FE21F56A2}"/>
+              </a:ext>
+            </a:extLst>
+          </p:cNvPr>
+          <p:cNvPicPr>
+            <a:picLocks noChangeAspect="1"/>
+          </p:cNvPicPr>
+          <p:nvPr/>
+        </p:nvPicPr>
+        <p:blipFill>
+          <a:blip r:embed="rId2"/>
+          <a:stretch>
+            <a:fillRect/>
+          </a:stretch>
+        </p:blipFill>
+        <p:spPr>
+          <a:xfrm>
+            <a:off x="4039203" y="249592"/>
+            <a:ext cx="3057525" cy="4581525"/>
+          </a:xfrm>
+          <a:prstGeom prst="rect">
+            <a:avLst/>
+          </a:prstGeom>
+        </p:spPr>
+      </p:pic>
+      <p:pic>
+        <p:nvPicPr>
+          <p:cNvPr id="5" name="Picture 4">
+            <a:extLst>
+              <a:ext uri="{FF2B5EF4-FFF2-40B4-BE49-F238E27FC236}">
+                <a16:creationId xmlns:a16="http://schemas.microsoft.com/office/drawing/2014/main" id="{1F6A48FC-6F63-4C6A-A911-EA30DF5D1A5A}"/>
+              </a:ext>
+            </a:extLst>
+          </p:cNvPr>
+          <p:cNvPicPr>
+            <a:picLocks noChangeAspect="1"/>
+          </p:cNvPicPr>
+          <p:nvPr/>
+        </p:nvPicPr>
+        <p:blipFill>
+          <a:blip r:embed="rId3"/>
+          <a:stretch>
+            <a:fillRect/>
+          </a:stretch>
+        </p:blipFill>
+        <p:spPr>
+          <a:xfrm>
+            <a:off x="7480478" y="226032"/>
+            <a:ext cx="3057525" cy="4581525"/>
+          </a:xfrm>
+          <a:prstGeom prst="rect">
+            <a:avLst/>
+          </a:prstGeom>
+        </p:spPr>
+      </p:pic>
+      <p:pic>
+        <p:nvPicPr>
+          <p:cNvPr id="6" name="Picture 5">
+            <a:extLst>
+              <a:ext uri="{FF2B5EF4-FFF2-40B4-BE49-F238E27FC236}">
+                <a16:creationId xmlns:a16="http://schemas.microsoft.com/office/drawing/2014/main" id="{4465A770-44CB-42A0-9813-CD51A4714AE9}"/>
+              </a:ext>
+            </a:extLst>
+          </p:cNvPr>
+          <p:cNvPicPr>
+            <a:picLocks noChangeAspect="1"/>
+          </p:cNvPicPr>
+          <p:nvPr/>
+        </p:nvPicPr>
+        <p:blipFill>
+          <a:blip r:embed="rId4"/>
+          <a:stretch>
+            <a:fillRect/>
+          </a:stretch>
+        </p:blipFill>
+        <p:spPr>
+          <a:xfrm>
+            <a:off x="597928" y="226033"/>
+            <a:ext cx="3057525" cy="4581525"/>
+          </a:xfrm>
+          <a:prstGeom prst="rect">
+            <a:avLst/>
+          </a:prstGeom>
+        </p:spPr>
+      </p:pic>
+      <p:sp>
+        <p:nvSpPr>
+          <p:cNvPr id="7" name="TextBox 6">
+            <a:extLst>
+              <a:ext uri="{FF2B5EF4-FFF2-40B4-BE49-F238E27FC236}">
+                <a16:creationId xmlns:a16="http://schemas.microsoft.com/office/drawing/2014/main" id="{D214C1B0-228D-4736-9DC5-5930D89D0F87}"/>
+              </a:ext>
+            </a:extLst>
+          </p:cNvPr>
+          <p:cNvSpPr txBox="1"/>
+          <p:nvPr/>
+        </p:nvSpPr>
+        <p:spPr>
+          <a:xfrm>
+            <a:off x="681434" y="5064127"/>
+            <a:ext cx="3357769" cy="369332"/>
+          </a:xfrm>
+          <a:prstGeom prst="rect">
+            <a:avLst/>
+          </a:prstGeom>
+          <a:noFill/>
+        </p:spPr>
+        <p:txBody>
+          <a:bodyPr wrap="square" rtlCol="0">
+            <a:spAutoFit/>
+          </a:bodyPr>
+          <a:lstStyle/>
+          <a:p>
+            <a:r>
+              <a:rPr lang="en-US" dirty="0"/>
+              <a:t>HR IMAGE</a:t>
+            </a:r>
+          </a:p>
+        </p:txBody>
+      </p:sp>
+      <p:sp>
+        <p:nvSpPr>
+          <p:cNvPr id="8" name="TextBox 7">
+            <a:extLst>
+              <a:ext uri="{FF2B5EF4-FFF2-40B4-BE49-F238E27FC236}">
+                <a16:creationId xmlns:a16="http://schemas.microsoft.com/office/drawing/2014/main" id="{12695548-3E32-4CC6-9E32-C2494EF701FE}"/>
+              </a:ext>
+            </a:extLst>
+          </p:cNvPr>
+          <p:cNvSpPr txBox="1"/>
+          <p:nvPr/>
+        </p:nvSpPr>
+        <p:spPr>
+          <a:xfrm>
+            <a:off x="4183062" y="5027032"/>
+            <a:ext cx="3357769" cy="369332"/>
+          </a:xfrm>
+          <a:prstGeom prst="rect">
+            <a:avLst/>
+          </a:prstGeom>
+          <a:noFill/>
+        </p:spPr>
+        <p:txBody>
+          <a:bodyPr wrap="square" rtlCol="0">
+            <a:spAutoFit/>
+          </a:bodyPr>
+          <a:lstStyle/>
+          <a:p>
+            <a:r>
+              <a:rPr lang="en-US" dirty="0"/>
+              <a:t>INTERPOLATED IMAGE</a:t>
+            </a:r>
+          </a:p>
+        </p:txBody>
+      </p:sp>
+      <p:sp>
+        <p:nvSpPr>
+          <p:cNvPr id="9" name="TextBox 8">
+            <a:extLst>
+              <a:ext uri="{FF2B5EF4-FFF2-40B4-BE49-F238E27FC236}">
+                <a16:creationId xmlns:a16="http://schemas.microsoft.com/office/drawing/2014/main" id="{106A809E-B458-4D7F-A67C-2A826295628B}"/>
+              </a:ext>
+            </a:extLst>
+          </p:cNvPr>
+          <p:cNvSpPr txBox="1"/>
+          <p:nvPr/>
+        </p:nvSpPr>
+        <p:spPr>
+          <a:xfrm>
+            <a:off x="7737631" y="5064127"/>
+            <a:ext cx="3357769" cy="369332"/>
+          </a:xfrm>
+          <a:prstGeom prst="rect">
+            <a:avLst/>
+          </a:prstGeom>
+          <a:noFill/>
+        </p:spPr>
+        <p:txBody>
+          <a:bodyPr wrap="square" rtlCol="0">
+            <a:spAutoFit/>
+          </a:bodyPr>
+          <a:lstStyle/>
+          <a:p>
+            <a:r>
+              <a:rPr lang="en-US" dirty="0"/>
+              <a:t>PREDICTED IMAGE</a:t>
+            </a:r>
+          </a:p>
+        </p:txBody>
+      </p:sp>
+      <p:sp>
+        <p:nvSpPr>
+          <p:cNvPr id="10" name="TextBox 9">
+            <a:extLst>
+              <a:ext uri="{FF2B5EF4-FFF2-40B4-BE49-F238E27FC236}">
+                <a16:creationId xmlns:a16="http://schemas.microsoft.com/office/drawing/2014/main" id="{EF383E37-9C4A-47D6-98B0-41B5D0EB2C4E}"/>
+              </a:ext>
+            </a:extLst>
+          </p:cNvPr>
+          <p:cNvSpPr txBox="1"/>
+          <p:nvPr/>
+        </p:nvSpPr>
+        <p:spPr>
+          <a:xfrm>
+            <a:off x="681434" y="5524799"/>
+            <a:ext cx="2279560" cy="369332"/>
+          </a:xfrm>
+          <a:prstGeom prst="rect">
+            <a:avLst/>
+          </a:prstGeom>
+          <a:noFill/>
+        </p:spPr>
+        <p:txBody>
+          <a:bodyPr wrap="square" rtlCol="0">
+            <a:spAutoFit/>
+          </a:bodyPr>
+          <a:lstStyle/>
+          <a:p>
+            <a:r>
+              <a:rPr lang="en-IN" dirty="0"/>
+              <a:t>K = 5e3</a:t>
+            </a:r>
+          </a:p>
+        </p:txBody>
+      </p:sp>
+      <p:sp>
+        <p:nvSpPr>
+          <p:cNvPr id="11" name="TextBox 10">
+            <a:extLst>
+              <a:ext uri="{FF2B5EF4-FFF2-40B4-BE49-F238E27FC236}">
+                <a16:creationId xmlns:a16="http://schemas.microsoft.com/office/drawing/2014/main" id="{F747FF66-1357-40FB-BC46-3AA718090653}"/>
+              </a:ext>
+            </a:extLst>
+          </p:cNvPr>
+          <p:cNvSpPr txBox="1"/>
+          <p:nvPr/>
+        </p:nvSpPr>
+        <p:spPr>
+          <a:xfrm>
+            <a:off x="695606" y="5985471"/>
+            <a:ext cx="2279560" cy="369332"/>
+          </a:xfrm>
+          <a:prstGeom prst="rect">
+            <a:avLst/>
+          </a:prstGeom>
+          <a:noFill/>
+        </p:spPr>
+        <p:txBody>
+          <a:bodyPr wrap="square" rtlCol="0">
+            <a:spAutoFit/>
+          </a:bodyPr>
+          <a:lstStyle/>
+          <a:p>
+            <a:r>
+              <a:rPr lang="en-IN" dirty="0"/>
+              <a:t>PSNR MEAN : 23.54 </a:t>
+            </a:r>
+          </a:p>
+        </p:txBody>
+      </p:sp>
+      <p:sp>
+        <p:nvSpPr>
+          <p:cNvPr id="12" name="TextBox 11">
+            <a:extLst>
+              <a:ext uri="{FF2B5EF4-FFF2-40B4-BE49-F238E27FC236}">
+                <a16:creationId xmlns:a16="http://schemas.microsoft.com/office/drawing/2014/main" id="{346750B3-3948-4F54-8DCA-A432BB497E4E}"/>
+              </a:ext>
+            </a:extLst>
+          </p:cNvPr>
+          <p:cNvSpPr txBox="1"/>
+          <p:nvPr/>
+        </p:nvSpPr>
+        <p:spPr>
+          <a:xfrm>
+            <a:off x="7737631" y="5396364"/>
+            <a:ext cx="2279560" cy="369332"/>
+          </a:xfrm>
+          <a:prstGeom prst="rect">
+            <a:avLst/>
+          </a:prstGeom>
+          <a:noFill/>
+        </p:spPr>
+        <p:txBody>
+          <a:bodyPr wrap="square" rtlCol="0">
+            <a:spAutoFit/>
+          </a:bodyPr>
+          <a:lstStyle/>
+          <a:p>
+            <a:r>
+              <a:rPr lang="en-IN" dirty="0"/>
+              <a:t>PSNR : 20.40 </a:t>
+            </a:r>
+          </a:p>
+        </p:txBody>
+      </p:sp>
+      <p:sp>
+        <p:nvSpPr>
+          <p:cNvPr id="13" name="TextBox 12">
+            <a:extLst>
+              <a:ext uri="{FF2B5EF4-FFF2-40B4-BE49-F238E27FC236}">
+                <a16:creationId xmlns:a16="http://schemas.microsoft.com/office/drawing/2014/main" id="{77868FE0-C257-4093-B9E6-191E96AD1926}"/>
+              </a:ext>
+            </a:extLst>
+          </p:cNvPr>
+          <p:cNvSpPr txBox="1"/>
+          <p:nvPr/>
+        </p:nvSpPr>
+        <p:spPr>
+          <a:xfrm>
+            <a:off x="695606" y="6446143"/>
+            <a:ext cx="2279560" cy="369332"/>
+          </a:xfrm>
+          <a:prstGeom prst="rect">
+            <a:avLst/>
+          </a:prstGeom>
+          <a:noFill/>
+        </p:spPr>
+        <p:txBody>
+          <a:bodyPr wrap="square" rtlCol="0">
+            <a:spAutoFit/>
+          </a:bodyPr>
+          <a:lstStyle/>
+          <a:p>
+            <a:r>
+              <a:rPr lang="en-IN" dirty="0"/>
+              <a:t>PSNR Max : 27.5</a:t>
+            </a:r>
+          </a:p>
+        </p:txBody>
+      </p:sp>
+      <p:sp>
+        <p:nvSpPr>
+          <p:cNvPr id="14" name="TextBox 13">
+            <a:extLst>
+              <a:ext uri="{FF2B5EF4-FFF2-40B4-BE49-F238E27FC236}">
+                <a16:creationId xmlns:a16="http://schemas.microsoft.com/office/drawing/2014/main" id="{EE7D1C3B-4E7F-4735-8C43-144CDC0D8147}"/>
+              </a:ext>
+            </a:extLst>
+          </p:cNvPr>
+          <p:cNvSpPr txBox="1"/>
+          <p:nvPr/>
+        </p:nvSpPr>
+        <p:spPr>
+          <a:xfrm>
+            <a:off x="3361855" y="6368631"/>
+            <a:ext cx="2279560" cy="369332"/>
+          </a:xfrm>
+          <a:prstGeom prst="rect">
+            <a:avLst/>
+          </a:prstGeom>
+          <a:noFill/>
+        </p:spPr>
+        <p:txBody>
+          <a:bodyPr wrap="square" rtlCol="0">
+            <a:spAutoFit/>
+          </a:bodyPr>
+          <a:lstStyle/>
+          <a:p>
+            <a:r>
+              <a:rPr lang="en-IN" dirty="0"/>
+              <a:t>Patch Size = 5x5</a:t>
+            </a:r>
+          </a:p>
+        </p:txBody>
+      </p:sp>
+      <p:sp>
+        <p:nvSpPr>
+          <p:cNvPr id="15" name="TextBox 14">
+            <a:extLst>
+              <a:ext uri="{FF2B5EF4-FFF2-40B4-BE49-F238E27FC236}">
+                <a16:creationId xmlns:a16="http://schemas.microsoft.com/office/drawing/2014/main" id="{3E93585D-22A0-4316-87BF-32EF1AEBC883}"/>
+              </a:ext>
+            </a:extLst>
+          </p:cNvPr>
+          <p:cNvSpPr txBox="1"/>
+          <p:nvPr/>
+        </p:nvSpPr>
+        <p:spPr>
+          <a:xfrm>
+            <a:off x="5627335" y="6342365"/>
+            <a:ext cx="2279560" cy="369332"/>
+          </a:xfrm>
+          <a:prstGeom prst="rect">
+            <a:avLst/>
+          </a:prstGeom>
+          <a:noFill/>
+        </p:spPr>
+        <p:txBody>
+          <a:bodyPr wrap="square" rtlCol="0">
+            <a:spAutoFit/>
+          </a:bodyPr>
+          <a:lstStyle/>
+          <a:p>
+            <a:r>
+              <a:rPr lang="en-IN" dirty="0"/>
+              <a:t>Epsilon=0.2 </a:t>
+            </a:r>
+          </a:p>
+        </p:txBody>
+      </p:sp>
+      <p:sp>
+        <p:nvSpPr>
+          <p:cNvPr id="16" name="TextBox 15">
+            <a:extLst>
+              <a:ext uri="{FF2B5EF4-FFF2-40B4-BE49-F238E27FC236}">
+                <a16:creationId xmlns:a16="http://schemas.microsoft.com/office/drawing/2014/main" id="{AD463435-D909-4B21-AADE-550F1241E184}"/>
+              </a:ext>
+            </a:extLst>
+          </p:cNvPr>
+          <p:cNvSpPr txBox="1"/>
+          <p:nvPr/>
+        </p:nvSpPr>
+        <p:spPr>
+          <a:xfrm>
+            <a:off x="7606651" y="6316099"/>
+            <a:ext cx="2279560" cy="369332"/>
+          </a:xfrm>
+          <a:prstGeom prst="rect">
+            <a:avLst/>
+          </a:prstGeom>
+          <a:noFill/>
+        </p:spPr>
+        <p:txBody>
+          <a:bodyPr wrap="square" rtlCol="0">
+            <a:spAutoFit/>
+          </a:bodyPr>
+          <a:lstStyle/>
+          <a:p>
+            <a:r>
+              <a:rPr lang="en-IN" dirty="0"/>
+              <a:t>C=362 </a:t>
+            </a:r>
+          </a:p>
+        </p:txBody>
+      </p:sp>
     </p:spTree>
     <p:extLst>
       <p:ext uri="{BB962C8B-B14F-4D97-AF65-F5344CB8AC3E}">
@@ -10751,7 +11632,7 @@
 </file>
 
 <file path=ppt/slides/slide16.xml><?xml version="1.0" encoding="utf-8"?>
-<p:sld xmlns:a="http://schemas.openxmlformats.org/drawingml/2006/main" xmlns:r="http://schemas.openxmlformats.org/officeDocument/2006/relationships" xmlns:p="http://schemas.openxmlformats.org/presentationml/2006/main">
+<p:sld xmlns:a="http://schemas.openxmlformats.org/drawingml/2006/main" xmlns:r="http://schemas.openxmlformats.org/officeDocument/2006/relationships" xmlns:p="http://schemas.openxmlformats.org/presentationml/2006/main" showMasterSp="0">
   <p:cSld>
     <p:spTree>
       <p:nvGrpSpPr>
@@ -10767,73 +11648,15 @@
           <a:chExt cx="0" cy="0"/>
         </a:xfrm>
       </p:grpSpPr>
-      <p:sp>
-        <p:nvSpPr>
-          <p:cNvPr id="2" name="Title 1">
+      <p:pic>
+        <p:nvPicPr>
+          <p:cNvPr id="7" name="Picture 6">
             <a:extLst>
               <a:ext uri="{FF2B5EF4-FFF2-40B4-BE49-F238E27FC236}">
-                <a16:creationId xmlns:a16="http://schemas.microsoft.com/office/drawing/2014/main" id="{D38C584D-4550-4004-8396-3ADD6A335AA0}"/>
+                <a16:creationId xmlns:a16="http://schemas.microsoft.com/office/drawing/2014/main" id="{37F64C9F-D1C7-4697-9257-1E542FD48442}"/>
               </a:ext>
             </a:extLst>
           </p:cNvPr>
-          <p:cNvSpPr>
-            <a:spLocks noGrp="1"/>
-          </p:cNvSpPr>
-          <p:nvPr>
-            <p:ph type="title"/>
-          </p:nvPr>
-        </p:nvSpPr>
-        <p:spPr>
-          <a:xfrm>
-            <a:off x="684211" y="5194852"/>
-            <a:ext cx="9917527" cy="799547"/>
-          </a:xfrm>
-        </p:spPr>
-        <p:txBody>
-          <a:bodyPr/>
-          <a:lstStyle/>
-          <a:p>
-            <a:r>
-              <a:rPr lang="en-US" dirty="0"/>
-              <a:t>Comparison Of DIFFERENT Methods</a:t>
-            </a:r>
-          </a:p>
-        </p:txBody>
-      </p:sp>
-      <p:sp>
-        <p:nvSpPr>
-          <p:cNvPr id="3" name="TextBox 2">
-            <a:extLst/>
-          </p:cNvPr>
-          <p:cNvSpPr txBox="1"/>
-          <p:nvPr/>
-        </p:nvSpPr>
-        <p:spPr>
-          <a:xfrm>
-            <a:off x="3665370" y="4825520"/>
-            <a:ext cx="3357769" cy="369332"/>
-          </a:xfrm>
-          <a:prstGeom prst="rect">
-            <a:avLst/>
-          </a:prstGeom>
-          <a:noFill/>
-        </p:spPr>
-        <p:txBody>
-          <a:bodyPr wrap="square" rtlCol="0">
-            <a:spAutoFit/>
-          </a:bodyPr>
-          <a:lstStyle/>
-          <a:p>
-            <a:r>
-              <a:rPr lang="en-US" dirty="0"/>
-              <a:t>KNN, PSNR=19.69</a:t>
-            </a:r>
-          </a:p>
-        </p:txBody>
-      </p:sp>
-      <p:pic>
-        <p:nvPicPr>
-          <p:cNvPr id="4" name="Picture 3"/>
           <p:cNvPicPr>
             <a:picLocks noChangeAspect="1"/>
           </p:cNvPicPr>
@@ -10847,17 +11670,268 @@
         </p:blipFill>
         <p:spPr>
           <a:xfrm>
-            <a:off x="3241299" y="185717"/>
-            <a:ext cx="3028950" cy="4580953"/>
+            <a:off x="590384" y="236713"/>
+            <a:ext cx="3057525" cy="4581525"/>
           </a:xfrm>
           <a:prstGeom prst="rect">
             <a:avLst/>
           </a:prstGeom>
         </p:spPr>
       </p:pic>
+      <p:sp>
+        <p:nvSpPr>
+          <p:cNvPr id="8" name="TextBox 7">
+            <a:extLst>
+              <a:ext uri="{FF2B5EF4-FFF2-40B4-BE49-F238E27FC236}">
+                <a16:creationId xmlns:a16="http://schemas.microsoft.com/office/drawing/2014/main" id="{8B998153-FEB8-4E6D-873E-49C519A21DF2}"/>
+              </a:ext>
+            </a:extLst>
+          </p:cNvPr>
+          <p:cNvSpPr txBox="1"/>
+          <p:nvPr/>
+        </p:nvSpPr>
+        <p:spPr>
+          <a:xfrm>
+            <a:off x="550454" y="4999732"/>
+            <a:ext cx="3357769" cy="369332"/>
+          </a:xfrm>
+          <a:prstGeom prst="rect">
+            <a:avLst/>
+          </a:prstGeom>
+          <a:noFill/>
+        </p:spPr>
+        <p:txBody>
+          <a:bodyPr wrap="square" rtlCol="0">
+            <a:spAutoFit/>
+          </a:bodyPr>
+          <a:lstStyle/>
+          <a:p>
+            <a:r>
+              <a:rPr lang="en-US" dirty="0"/>
+              <a:t>HR IMAGE</a:t>
+            </a:r>
+          </a:p>
+        </p:txBody>
+      </p:sp>
+      <p:sp>
+        <p:nvSpPr>
+          <p:cNvPr id="9" name="TextBox 8">
+            <a:extLst>
+              <a:ext uri="{FF2B5EF4-FFF2-40B4-BE49-F238E27FC236}">
+                <a16:creationId xmlns:a16="http://schemas.microsoft.com/office/drawing/2014/main" id="{3D5AB4B2-9E0B-47AD-B0FE-896CD54013AA}"/>
+              </a:ext>
+            </a:extLst>
+          </p:cNvPr>
+          <p:cNvSpPr txBox="1"/>
+          <p:nvPr/>
+        </p:nvSpPr>
+        <p:spPr>
+          <a:xfrm>
+            <a:off x="4052082" y="4962637"/>
+            <a:ext cx="3357769" cy="369332"/>
+          </a:xfrm>
+          <a:prstGeom prst="rect">
+            <a:avLst/>
+          </a:prstGeom>
+          <a:noFill/>
+        </p:spPr>
+        <p:txBody>
+          <a:bodyPr wrap="square" rtlCol="0">
+            <a:spAutoFit/>
+          </a:bodyPr>
+          <a:lstStyle/>
+          <a:p>
+            <a:r>
+              <a:rPr lang="en-US" dirty="0"/>
+              <a:t>INTERPOLATED IMAGE</a:t>
+            </a:r>
+          </a:p>
+        </p:txBody>
+      </p:sp>
+      <p:sp>
+        <p:nvSpPr>
+          <p:cNvPr id="10" name="TextBox 9">
+            <a:extLst>
+              <a:ext uri="{FF2B5EF4-FFF2-40B4-BE49-F238E27FC236}">
+                <a16:creationId xmlns:a16="http://schemas.microsoft.com/office/drawing/2014/main" id="{2BE5F433-EB29-4593-AA75-8936469C32CE}"/>
+              </a:ext>
+            </a:extLst>
+          </p:cNvPr>
+          <p:cNvSpPr txBox="1"/>
+          <p:nvPr/>
+        </p:nvSpPr>
+        <p:spPr>
+          <a:xfrm>
+            <a:off x="7606651" y="4999732"/>
+            <a:ext cx="3357769" cy="369332"/>
+          </a:xfrm>
+          <a:prstGeom prst="rect">
+            <a:avLst/>
+          </a:prstGeom>
+          <a:noFill/>
+        </p:spPr>
+        <p:txBody>
+          <a:bodyPr wrap="square" rtlCol="0">
+            <a:spAutoFit/>
+          </a:bodyPr>
+          <a:lstStyle/>
+          <a:p>
+            <a:r>
+              <a:rPr lang="en-US" dirty="0"/>
+              <a:t>PREDICTED IMAGE</a:t>
+            </a:r>
+          </a:p>
+        </p:txBody>
+      </p:sp>
+      <p:sp>
+        <p:nvSpPr>
+          <p:cNvPr id="11" name="TextBox 10">
+            <a:extLst>
+              <a:ext uri="{FF2B5EF4-FFF2-40B4-BE49-F238E27FC236}">
+                <a16:creationId xmlns:a16="http://schemas.microsoft.com/office/drawing/2014/main" id="{A576247C-CB39-462F-8899-3E4DD8F94C7F}"/>
+              </a:ext>
+            </a:extLst>
+          </p:cNvPr>
+          <p:cNvSpPr txBox="1"/>
+          <p:nvPr/>
+        </p:nvSpPr>
+        <p:spPr>
+          <a:xfrm>
+            <a:off x="550454" y="5460404"/>
+            <a:ext cx="2279560" cy="369332"/>
+          </a:xfrm>
+          <a:prstGeom prst="rect">
+            <a:avLst/>
+          </a:prstGeom>
+          <a:noFill/>
+        </p:spPr>
+        <p:txBody>
+          <a:bodyPr wrap="square" rtlCol="0">
+            <a:spAutoFit/>
+          </a:bodyPr>
+          <a:lstStyle/>
+          <a:p>
+            <a:r>
+              <a:rPr lang="en-IN" dirty="0"/>
+              <a:t>K = 10e4</a:t>
+            </a:r>
+          </a:p>
+        </p:txBody>
+      </p:sp>
+      <p:sp>
+        <p:nvSpPr>
+          <p:cNvPr id="12" name="TextBox 11">
+            <a:extLst>
+              <a:ext uri="{FF2B5EF4-FFF2-40B4-BE49-F238E27FC236}">
+                <a16:creationId xmlns:a16="http://schemas.microsoft.com/office/drawing/2014/main" id="{FBEF3FB0-1504-4C83-AB98-48EDDACE48EA}"/>
+              </a:ext>
+            </a:extLst>
+          </p:cNvPr>
+          <p:cNvSpPr txBox="1"/>
+          <p:nvPr/>
+        </p:nvSpPr>
+        <p:spPr>
+          <a:xfrm>
+            <a:off x="550454" y="5921076"/>
+            <a:ext cx="2279560" cy="369332"/>
+          </a:xfrm>
+          <a:prstGeom prst="rect">
+            <a:avLst/>
+          </a:prstGeom>
+          <a:noFill/>
+        </p:spPr>
+        <p:txBody>
+          <a:bodyPr wrap="square" rtlCol="0">
+            <a:spAutoFit/>
+          </a:bodyPr>
+          <a:lstStyle/>
+          <a:p>
+            <a:r>
+              <a:rPr lang="en-IN" dirty="0"/>
+              <a:t>PSNR MEAN : 23.22 </a:t>
+            </a:r>
+          </a:p>
+        </p:txBody>
+      </p:sp>
+      <p:sp>
+        <p:nvSpPr>
+          <p:cNvPr id="13" name="TextBox 12">
+            <a:extLst>
+              <a:ext uri="{FF2B5EF4-FFF2-40B4-BE49-F238E27FC236}">
+                <a16:creationId xmlns:a16="http://schemas.microsoft.com/office/drawing/2014/main" id="{39CF9743-7980-4081-9D7B-13ABD216FE12}"/>
+              </a:ext>
+            </a:extLst>
+          </p:cNvPr>
+          <p:cNvSpPr txBox="1"/>
+          <p:nvPr/>
+        </p:nvSpPr>
+        <p:spPr>
+          <a:xfrm>
+            <a:off x="7606651" y="5331969"/>
+            <a:ext cx="2279560" cy="369332"/>
+          </a:xfrm>
+          <a:prstGeom prst="rect">
+            <a:avLst/>
+          </a:prstGeom>
+          <a:noFill/>
+        </p:spPr>
+        <p:txBody>
+          <a:bodyPr wrap="square" rtlCol="0">
+            <a:spAutoFit/>
+          </a:bodyPr>
+          <a:lstStyle/>
+          <a:p>
+            <a:r>
+              <a:rPr lang="en-IN" dirty="0"/>
+              <a:t>PSNR : 22.06  </a:t>
+            </a:r>
+          </a:p>
+        </p:txBody>
+      </p:sp>
+      <p:sp>
+        <p:nvSpPr>
+          <p:cNvPr id="14" name="TextBox 13">
+            <a:extLst>
+              <a:ext uri="{FF2B5EF4-FFF2-40B4-BE49-F238E27FC236}">
+                <a16:creationId xmlns:a16="http://schemas.microsoft.com/office/drawing/2014/main" id="{0C339212-85CE-412F-A9A0-AC71F4F79C6F}"/>
+              </a:ext>
+            </a:extLst>
+          </p:cNvPr>
+          <p:cNvSpPr txBox="1"/>
+          <p:nvPr/>
+        </p:nvSpPr>
+        <p:spPr>
+          <a:xfrm>
+            <a:off x="550454" y="6381748"/>
+            <a:ext cx="2279560" cy="369332"/>
+          </a:xfrm>
+          <a:prstGeom prst="rect">
+            <a:avLst/>
+          </a:prstGeom>
+          <a:noFill/>
+        </p:spPr>
+        <p:txBody>
+          <a:bodyPr wrap="square" rtlCol="0">
+            <a:spAutoFit/>
+          </a:bodyPr>
+          <a:lstStyle/>
+          <a:p>
+            <a:r>
+              <a:rPr lang="en-IN" dirty="0"/>
+              <a:t>PSNR Max : 24.97</a:t>
+            </a:r>
+          </a:p>
+        </p:txBody>
+      </p:sp>
       <p:pic>
         <p:nvPicPr>
-          <p:cNvPr id="5" name="Picture 4"/>
+          <p:cNvPr id="16" name="Picture 15">
+            <a:extLst>
+              <a:ext uri="{FF2B5EF4-FFF2-40B4-BE49-F238E27FC236}">
+                <a16:creationId xmlns:a16="http://schemas.microsoft.com/office/drawing/2014/main" id="{DCF845A7-1628-4650-9386-7034C5247EC8}"/>
+              </a:ext>
+            </a:extLst>
+          </p:cNvPr>
           <p:cNvPicPr>
             <a:picLocks noChangeAspect="1"/>
           </p:cNvPicPr>
@@ -10871,51 +11945,20 @@
         </p:blipFill>
         <p:spPr>
           <a:xfrm>
-            <a:off x="106016" y="185717"/>
-            <a:ext cx="3057143" cy="4580953"/>
+            <a:off x="4052082" y="236713"/>
+            <a:ext cx="3057525" cy="4581525"/>
           </a:xfrm>
           <a:prstGeom prst="rect">
             <a:avLst/>
           </a:prstGeom>
         </p:spPr>
       </p:pic>
-      <p:sp>
-        <p:nvSpPr>
-          <p:cNvPr id="6" name="TextBox 5">
-            <a:extLst/>
-          </p:cNvPr>
-          <p:cNvSpPr txBox="1"/>
-          <p:nvPr/>
-        </p:nvSpPr>
-        <p:spPr>
-          <a:xfrm>
-            <a:off x="817260" y="4825520"/>
-            <a:ext cx="1687402" cy="369332"/>
-          </a:xfrm>
-          <a:prstGeom prst="rect">
-            <a:avLst/>
-          </a:prstGeom>
-          <a:noFill/>
-        </p:spPr>
-        <p:txBody>
-          <a:bodyPr wrap="square" rtlCol="0">
-            <a:spAutoFit/>
-          </a:bodyPr>
-          <a:lstStyle/>
-          <a:p>
-            <a:r>
-              <a:rPr lang="en-US" dirty="0"/>
-              <a:t>INPUT IMAGE</a:t>
-            </a:r>
-          </a:p>
-        </p:txBody>
-      </p:sp>
       <p:pic>
         <p:nvPicPr>
-          <p:cNvPr id="7" name="Picture 6">
+          <p:cNvPr id="18" name="Picture 17">
             <a:extLst>
               <a:ext uri="{FF2B5EF4-FFF2-40B4-BE49-F238E27FC236}">
-                <a16:creationId xmlns:a16="http://schemas.microsoft.com/office/drawing/2014/main" id="{854699F7-6BB1-47A3-BFFA-69C5C46865E1}"/>
+                <a16:creationId xmlns:a16="http://schemas.microsoft.com/office/drawing/2014/main" id="{C5A57070-8783-4408-B51F-409CDCE48817}"/>
               </a:ext>
             </a:extLst>
           </p:cNvPr>
@@ -10932,8 +11975,8 @@
         </p:blipFill>
         <p:spPr>
           <a:xfrm>
-            <a:off x="6348389" y="185717"/>
-            <a:ext cx="3057143" cy="4580952"/>
+            <a:off x="7443931" y="236713"/>
+            <a:ext cx="3057525" cy="4581525"/>
           </a:xfrm>
           <a:prstGeom prst="rect">
             <a:avLst/>
@@ -10942,10 +11985,10 @@
       </p:pic>
       <p:sp>
         <p:nvSpPr>
-          <p:cNvPr id="8" name="TextBox 7">
+          <p:cNvPr id="19" name="TextBox 18">
             <a:extLst>
               <a:ext uri="{FF2B5EF4-FFF2-40B4-BE49-F238E27FC236}">
-                <a16:creationId xmlns:a16="http://schemas.microsoft.com/office/drawing/2014/main" id="{EF4B98A9-7A98-4B1B-8B72-459B1BA2F318}"/>
+                <a16:creationId xmlns:a16="http://schemas.microsoft.com/office/drawing/2014/main" id="{46BEDBAA-1FCD-415B-82F9-B2F65057C0CD}"/>
               </a:ext>
             </a:extLst>
           </p:cNvPr>
@@ -10954,8 +11997,8 @@
         </p:nvSpPr>
         <p:spPr>
           <a:xfrm>
-            <a:off x="6799509" y="4796094"/>
-            <a:ext cx="3357769" cy="369332"/>
+            <a:off x="3361855" y="6368631"/>
+            <a:ext cx="2279560" cy="369332"/>
           </a:xfrm>
           <a:prstGeom prst="rect">
             <a:avLst/>
@@ -10969,8 +12012,78 @@
           <a:lstStyle/>
           <a:p>
             <a:r>
-              <a:rPr lang="en-US" dirty="0"/>
-              <a:t>SRCNN, PSNR=29.69</a:t>
+              <a:rPr lang="en-IN" dirty="0"/>
+              <a:t>Patch Size = 5x5</a:t>
+            </a:r>
+          </a:p>
+        </p:txBody>
+      </p:sp>
+      <p:sp>
+        <p:nvSpPr>
+          <p:cNvPr id="20" name="TextBox 19">
+            <a:extLst>
+              <a:ext uri="{FF2B5EF4-FFF2-40B4-BE49-F238E27FC236}">
+                <a16:creationId xmlns:a16="http://schemas.microsoft.com/office/drawing/2014/main" id="{ADDB8D9D-3B73-4F9D-A4E1-111E8D73F993}"/>
+              </a:ext>
+            </a:extLst>
+          </p:cNvPr>
+          <p:cNvSpPr txBox="1"/>
+          <p:nvPr/>
+        </p:nvSpPr>
+        <p:spPr>
+          <a:xfrm>
+            <a:off x="5627335" y="6342365"/>
+            <a:ext cx="2279560" cy="369332"/>
+          </a:xfrm>
+          <a:prstGeom prst="rect">
+            <a:avLst/>
+          </a:prstGeom>
+          <a:noFill/>
+        </p:spPr>
+        <p:txBody>
+          <a:bodyPr wrap="square" rtlCol="0">
+            <a:spAutoFit/>
+          </a:bodyPr>
+          <a:lstStyle/>
+          <a:p>
+            <a:r>
+              <a:rPr lang="en-IN" dirty="0"/>
+              <a:t>Epsilon=0.2 </a:t>
+            </a:r>
+          </a:p>
+        </p:txBody>
+      </p:sp>
+      <p:sp>
+        <p:nvSpPr>
+          <p:cNvPr id="21" name="TextBox 20">
+            <a:extLst>
+              <a:ext uri="{FF2B5EF4-FFF2-40B4-BE49-F238E27FC236}">
+                <a16:creationId xmlns:a16="http://schemas.microsoft.com/office/drawing/2014/main" id="{49484066-E5AE-44FE-B640-03898BE0C05D}"/>
+              </a:ext>
+            </a:extLst>
+          </p:cNvPr>
+          <p:cNvSpPr txBox="1"/>
+          <p:nvPr/>
+        </p:nvSpPr>
+        <p:spPr>
+          <a:xfrm>
+            <a:off x="7606651" y="6316099"/>
+            <a:ext cx="2279560" cy="369332"/>
+          </a:xfrm>
+          <a:prstGeom prst="rect">
+            <a:avLst/>
+          </a:prstGeom>
+          <a:noFill/>
+        </p:spPr>
+        <p:txBody>
+          <a:bodyPr wrap="square" rtlCol="0">
+            <a:spAutoFit/>
+          </a:bodyPr>
+          <a:lstStyle/>
+          <a:p>
+            <a:r>
+              <a:rPr lang="en-IN" dirty="0"/>
+              <a:t>C=362 </a:t>
             </a:r>
           </a:p>
         </p:txBody>
@@ -10978,7 +12091,7 @@
     </p:spTree>
     <p:extLst>
       <p:ext uri="{BB962C8B-B14F-4D97-AF65-F5344CB8AC3E}">
-        <p14:creationId xmlns:p14="http://schemas.microsoft.com/office/powerpoint/2010/main" val="1471262141"/>
+        <p14:creationId xmlns:p14="http://schemas.microsoft.com/office/powerpoint/2010/main" val="2162204368"/>
       </p:ext>
     </p:extLst>
   </p:cSld>
@@ -10988,8 +12101,8 @@
 </p:sld>
 </file>
 
-<file path=ppt/slides/slide2.xml><?xml version="1.0" encoding="utf-8"?>
-<p:sld xmlns:a="http://schemas.openxmlformats.org/drawingml/2006/main" xmlns:r="http://schemas.openxmlformats.org/officeDocument/2006/relationships" xmlns:p="http://schemas.openxmlformats.org/presentationml/2006/main">
+<file path=ppt/slides/slide17.xml><?xml version="1.0" encoding="utf-8"?>
+<p:sld xmlns:a="http://schemas.openxmlformats.org/drawingml/2006/main" xmlns:r="http://schemas.openxmlformats.org/officeDocument/2006/relationships" xmlns:p="http://schemas.openxmlformats.org/presentationml/2006/main" showMasterSp="0">
   <p:cSld>
     <p:spTree>
       <p:nvGrpSpPr>
@@ -11021,48 +12134,259 @@
             <p:ph type="title"/>
           </p:nvPr>
         </p:nvSpPr>
-        <p:spPr/>
+        <p:spPr>
+          <a:xfrm>
+            <a:off x="684211" y="5194852"/>
+            <a:ext cx="9917527" cy="799547"/>
+          </a:xfrm>
+        </p:spPr>
         <p:txBody>
           <a:bodyPr/>
           <a:lstStyle/>
           <a:p>
             <a:r>
               <a:rPr lang="en-US" dirty="0"/>
-              <a:t>Problem statement</a:t>
-            </a:r>
-          </a:p>
-        </p:txBody>
-      </p:sp>
-      <p:sp>
-        <p:nvSpPr>
-          <p:cNvPr id="3" name="Content Placeholder 2">
+              <a:t>Comparison Of DIFFERENT Methods</a:t>
+            </a:r>
+          </a:p>
+        </p:txBody>
+      </p:sp>
+      <p:sp>
+        <p:nvSpPr>
+          <p:cNvPr id="3" name="TextBox 2">
+            <a:extLst/>
+          </p:cNvPr>
+          <p:cNvSpPr txBox="1"/>
+          <p:nvPr/>
+        </p:nvSpPr>
+        <p:spPr>
+          <a:xfrm>
+            <a:off x="3665370" y="4825520"/>
+            <a:ext cx="3357769" cy="369332"/>
+          </a:xfrm>
+          <a:prstGeom prst="rect">
+            <a:avLst/>
+          </a:prstGeom>
+          <a:noFill/>
+        </p:spPr>
+        <p:txBody>
+          <a:bodyPr wrap="square" rtlCol="0">
+            <a:spAutoFit/>
+          </a:bodyPr>
+          <a:lstStyle/>
+          <a:p>
+            <a:r>
+              <a:rPr lang="en-US" dirty="0"/>
+              <a:t>KNN, PSNR=19.69</a:t>
+            </a:r>
+          </a:p>
+        </p:txBody>
+      </p:sp>
+      <p:pic>
+        <p:nvPicPr>
+          <p:cNvPr id="4" name="Picture 3"/>
+          <p:cNvPicPr>
+            <a:picLocks noChangeAspect="1"/>
+          </p:cNvPicPr>
+          <p:nvPr/>
+        </p:nvPicPr>
+        <p:blipFill>
+          <a:blip r:embed="rId2"/>
+          <a:stretch>
+            <a:fillRect/>
+          </a:stretch>
+        </p:blipFill>
+        <p:spPr>
+          <a:xfrm>
+            <a:off x="3054171" y="185715"/>
+            <a:ext cx="3028950" cy="4580953"/>
+          </a:xfrm>
+          <a:prstGeom prst="rect">
+            <a:avLst/>
+          </a:prstGeom>
+        </p:spPr>
+      </p:pic>
+      <p:pic>
+        <p:nvPicPr>
+          <p:cNvPr id="5" name="Picture 4"/>
+          <p:cNvPicPr>
+            <a:picLocks noChangeAspect="1"/>
+          </p:cNvPicPr>
+          <p:nvPr/>
+        </p:nvPicPr>
+        <p:blipFill>
+          <a:blip r:embed="rId3"/>
+          <a:stretch>
+            <a:fillRect/>
+          </a:stretch>
+        </p:blipFill>
+        <p:spPr>
+          <a:xfrm>
+            <a:off x="0" y="185716"/>
+            <a:ext cx="3057143" cy="4580953"/>
+          </a:xfrm>
+          <a:prstGeom prst="rect">
+            <a:avLst/>
+          </a:prstGeom>
+        </p:spPr>
+      </p:pic>
+      <p:sp>
+        <p:nvSpPr>
+          <p:cNvPr id="6" name="TextBox 5">
+            <a:extLst/>
+          </p:cNvPr>
+          <p:cNvSpPr txBox="1"/>
+          <p:nvPr/>
+        </p:nvSpPr>
+        <p:spPr>
+          <a:xfrm>
+            <a:off x="817260" y="4825520"/>
+            <a:ext cx="1687402" cy="369332"/>
+          </a:xfrm>
+          <a:prstGeom prst="rect">
+            <a:avLst/>
+          </a:prstGeom>
+          <a:noFill/>
+        </p:spPr>
+        <p:txBody>
+          <a:bodyPr wrap="square" rtlCol="0">
+            <a:spAutoFit/>
+          </a:bodyPr>
+          <a:lstStyle/>
+          <a:p>
+            <a:r>
+              <a:rPr lang="en-US" dirty="0"/>
+              <a:t>INPUT IMAGE</a:t>
+            </a:r>
+          </a:p>
+        </p:txBody>
+      </p:sp>
+      <p:pic>
+        <p:nvPicPr>
+          <p:cNvPr id="7" name="Picture 6">
             <a:extLst>
               <a:ext uri="{FF2B5EF4-FFF2-40B4-BE49-F238E27FC236}">
-                <a16:creationId xmlns:a16="http://schemas.microsoft.com/office/drawing/2014/main" id="{9C479926-0F91-4A33-BA02-FD07550CAC8E}"/>
+                <a16:creationId xmlns:a16="http://schemas.microsoft.com/office/drawing/2014/main" id="{854699F7-6BB1-47A3-BFFA-69C5C46865E1}"/>
               </a:ext>
             </a:extLst>
           </p:cNvPr>
-          <p:cNvSpPr>
-            <a:spLocks noGrp="1"/>
-          </p:cNvSpPr>
-          <p:nvPr>
-            <p:ph idx="1"/>
-          </p:nvPr>
-        </p:nvSpPr>
-        <p:spPr/>
-        <p:txBody>
-          <a:bodyPr/>
+          <p:cNvPicPr>
+            <a:picLocks noChangeAspect="1"/>
+          </p:cNvPicPr>
+          <p:nvPr/>
+        </p:nvPicPr>
+        <p:blipFill>
+          <a:blip r:embed="rId4"/>
+          <a:stretch>
+            <a:fillRect/>
+          </a:stretch>
+        </p:blipFill>
+        <p:spPr>
+          <a:xfrm>
+            <a:off x="6080149" y="199856"/>
+            <a:ext cx="3057143" cy="4580952"/>
+          </a:xfrm>
+          <a:prstGeom prst="rect">
+            <a:avLst/>
+          </a:prstGeom>
+        </p:spPr>
+      </p:pic>
+      <p:sp>
+        <p:nvSpPr>
+          <p:cNvPr id="8" name="TextBox 7">
+            <a:extLst>
+              <a:ext uri="{FF2B5EF4-FFF2-40B4-BE49-F238E27FC236}">
+                <a16:creationId xmlns:a16="http://schemas.microsoft.com/office/drawing/2014/main" id="{EF4B98A9-7A98-4B1B-8B72-459B1BA2F318}"/>
+              </a:ext>
+            </a:extLst>
+          </p:cNvPr>
+          <p:cNvSpPr txBox="1"/>
+          <p:nvPr/>
+        </p:nvSpPr>
+        <p:spPr>
+          <a:xfrm>
+            <a:off x="6799509" y="4796094"/>
+            <a:ext cx="3357769" cy="369332"/>
+          </a:xfrm>
+          <a:prstGeom prst="rect">
+            <a:avLst/>
+          </a:prstGeom>
+          <a:noFill/>
+        </p:spPr>
+        <p:txBody>
+          <a:bodyPr wrap="square" rtlCol="0">
+            <a:spAutoFit/>
+          </a:bodyPr>
           <a:lstStyle/>
           <a:p>
             <a:r>
               <a:rPr lang="en-US" dirty="0"/>
-              <a:t>Estimation of Low resolution image to higher resolution</a:t>
-            </a:r>
-          </a:p>
+              <a:t>SRCNN, PSNR=29.69</a:t>
+            </a:r>
+          </a:p>
+        </p:txBody>
+      </p:sp>
+      <p:pic>
+        <p:nvPicPr>
+          <p:cNvPr id="9" name="Picture 8">
+            <a:extLst>
+              <a:ext uri="{FF2B5EF4-FFF2-40B4-BE49-F238E27FC236}">
+                <a16:creationId xmlns:a16="http://schemas.microsoft.com/office/drawing/2014/main" id="{5EFB2F96-B7EF-4D8E-B0E5-8996A3B991F5}"/>
+              </a:ext>
+            </a:extLst>
+          </p:cNvPr>
+          <p:cNvPicPr>
+            <a:picLocks noChangeAspect="1"/>
+          </p:cNvPicPr>
+          <p:nvPr/>
+        </p:nvPicPr>
+        <p:blipFill>
+          <a:blip r:embed="rId5"/>
+          <a:stretch>
+            <a:fillRect/>
+          </a:stretch>
+        </p:blipFill>
+        <p:spPr>
+          <a:xfrm>
+            <a:off x="9134320" y="185143"/>
+            <a:ext cx="3057525" cy="4581525"/>
+          </a:xfrm>
+          <a:prstGeom prst="rect">
+            <a:avLst/>
+          </a:prstGeom>
+        </p:spPr>
+      </p:pic>
+      <p:sp>
+        <p:nvSpPr>
+          <p:cNvPr id="12" name="TextBox 11">
+            <a:extLst>
+              <a:ext uri="{FF2B5EF4-FFF2-40B4-BE49-F238E27FC236}">
+                <a16:creationId xmlns:a16="http://schemas.microsoft.com/office/drawing/2014/main" id="{C8C233E0-6484-43F1-B4FE-51617B9ADA95}"/>
+              </a:ext>
+            </a:extLst>
+          </p:cNvPr>
+          <p:cNvSpPr txBox="1"/>
+          <p:nvPr/>
+        </p:nvSpPr>
+        <p:spPr>
+          <a:xfrm>
+            <a:off x="9134320" y="4766668"/>
+            <a:ext cx="3357769" cy="369332"/>
+          </a:xfrm>
+          <a:prstGeom prst="rect">
+            <a:avLst/>
+          </a:prstGeom>
+          <a:noFill/>
+        </p:spPr>
+        <p:txBody>
+          <a:bodyPr wrap="square" rtlCol="0">
+            <a:spAutoFit/>
+          </a:bodyPr>
+          <a:lstStyle/>
           <a:p>
             <a:r>
               <a:rPr lang="en-US" dirty="0"/>
-              <a:t>Useful in many military and civilian applications, like surveillance,  auto target recognition, forensic and satellite imaging.</a:t>
+              <a:t>SVR, PSNR=22.06</a:t>
             </a:r>
           </a:p>
         </p:txBody>
@@ -11070,7 +12394,7 @@
     </p:spTree>
     <p:extLst>
       <p:ext uri="{BB962C8B-B14F-4D97-AF65-F5344CB8AC3E}">
-        <p14:creationId xmlns:p14="http://schemas.microsoft.com/office/powerpoint/2010/main" val="1610116488"/>
+        <p14:creationId xmlns:p14="http://schemas.microsoft.com/office/powerpoint/2010/main" val="1471262141"/>
       </p:ext>
     </p:extLst>
   </p:cSld>
@@ -11080,8 +12404,8 @@
 </p:sld>
 </file>
 
-<file path=ppt/slides/slide3.xml><?xml version="1.0" encoding="utf-8"?>
-<p:sld xmlns:a="http://schemas.openxmlformats.org/drawingml/2006/main" xmlns:r="http://schemas.openxmlformats.org/officeDocument/2006/relationships" xmlns:p="http://schemas.openxmlformats.org/presentationml/2006/main">
+<file path=ppt/slides/slide2.xml><?xml version="1.0" encoding="utf-8"?>
+<p:sld xmlns:a="http://schemas.openxmlformats.org/drawingml/2006/main" xmlns:r="http://schemas.openxmlformats.org/officeDocument/2006/relationships" xmlns:p="http://schemas.openxmlformats.org/presentationml/2006/main" showMasterSp="0">
   <p:cSld>
     <p:spTree>
       <p:nvGrpSpPr>
@@ -11120,6 +12444,98 @@
           <a:p>
             <a:r>
               <a:rPr lang="en-US" dirty="0"/>
+              <a:t>Problem statement</a:t>
+            </a:r>
+          </a:p>
+        </p:txBody>
+      </p:sp>
+      <p:sp>
+        <p:nvSpPr>
+          <p:cNvPr id="3" name="Content Placeholder 2">
+            <a:extLst>
+              <a:ext uri="{FF2B5EF4-FFF2-40B4-BE49-F238E27FC236}">
+                <a16:creationId xmlns:a16="http://schemas.microsoft.com/office/drawing/2014/main" id="{9C479926-0F91-4A33-BA02-FD07550CAC8E}"/>
+              </a:ext>
+            </a:extLst>
+          </p:cNvPr>
+          <p:cNvSpPr>
+            <a:spLocks noGrp="1"/>
+          </p:cNvSpPr>
+          <p:nvPr>
+            <p:ph idx="1"/>
+          </p:nvPr>
+        </p:nvSpPr>
+        <p:spPr/>
+        <p:txBody>
+          <a:bodyPr/>
+          <a:lstStyle/>
+          <a:p>
+            <a:r>
+              <a:rPr lang="en-US" dirty="0"/>
+              <a:t>Estimation of Low resolution image to higher resolution</a:t>
+            </a:r>
+          </a:p>
+          <a:p>
+            <a:r>
+              <a:rPr lang="en-US" dirty="0"/>
+              <a:t>Useful in many military and civilian applications, like surveillance,  auto target recognition, forensic and satellite imaging.</a:t>
+            </a:r>
+          </a:p>
+        </p:txBody>
+      </p:sp>
+    </p:spTree>
+    <p:extLst>
+      <p:ext uri="{BB962C8B-B14F-4D97-AF65-F5344CB8AC3E}">
+        <p14:creationId xmlns:p14="http://schemas.microsoft.com/office/powerpoint/2010/main" val="1610116488"/>
+      </p:ext>
+    </p:extLst>
+  </p:cSld>
+  <p:clrMapOvr>
+    <a:masterClrMapping/>
+  </p:clrMapOvr>
+</p:sld>
+</file>
+
+<file path=ppt/slides/slide3.xml><?xml version="1.0" encoding="utf-8"?>
+<p:sld xmlns:a="http://schemas.openxmlformats.org/drawingml/2006/main" xmlns:r="http://schemas.openxmlformats.org/officeDocument/2006/relationships" xmlns:p="http://schemas.openxmlformats.org/presentationml/2006/main" showMasterSp="0">
+  <p:cSld>
+    <p:spTree>
+      <p:nvGrpSpPr>
+        <p:cNvPr id="1" name=""/>
+        <p:cNvGrpSpPr/>
+        <p:nvPr/>
+      </p:nvGrpSpPr>
+      <p:grpSpPr>
+        <a:xfrm>
+          <a:off x="0" y="0"/>
+          <a:ext cx="0" cy="0"/>
+          <a:chOff x="0" y="0"/>
+          <a:chExt cx="0" cy="0"/>
+        </a:xfrm>
+      </p:grpSpPr>
+      <p:sp>
+        <p:nvSpPr>
+          <p:cNvPr id="2" name="Title 1">
+            <a:extLst>
+              <a:ext uri="{FF2B5EF4-FFF2-40B4-BE49-F238E27FC236}">
+                <a16:creationId xmlns:a16="http://schemas.microsoft.com/office/drawing/2014/main" id="{D38C584D-4550-4004-8396-3ADD6A335AA0}"/>
+              </a:ext>
+            </a:extLst>
+          </p:cNvPr>
+          <p:cNvSpPr>
+            <a:spLocks noGrp="1"/>
+          </p:cNvSpPr>
+          <p:nvPr>
+            <p:ph type="title"/>
+          </p:nvPr>
+        </p:nvSpPr>
+        <p:spPr/>
+        <p:txBody>
+          <a:bodyPr/>
+          <a:lstStyle/>
+          <a:p>
+            <a:r>
+              <a:rPr lang="en-US" dirty="0"/>
               <a:t>Methods</a:t>
             </a:r>
           </a:p>
@@ -11179,7 +12595,7 @@
 </file>
 
 <file path=ppt/slides/slide4.xml><?xml version="1.0" encoding="utf-8"?>
-<p:sld xmlns:a="http://schemas.openxmlformats.org/drawingml/2006/main" xmlns:r="http://schemas.openxmlformats.org/officeDocument/2006/relationships" xmlns:p="http://schemas.openxmlformats.org/presentationml/2006/main">
+<p:sld xmlns:a="http://schemas.openxmlformats.org/drawingml/2006/main" xmlns:r="http://schemas.openxmlformats.org/officeDocument/2006/relationships" xmlns:p="http://schemas.openxmlformats.org/presentationml/2006/main" showMasterSp="0">
   <p:cSld>
     <p:spTree>
       <p:nvGrpSpPr>
@@ -12153,7 +13569,7 @@
 </file>
 
 <file path=ppt/slides/slide5.xml><?xml version="1.0" encoding="utf-8"?>
-<p:sld xmlns:a="http://schemas.openxmlformats.org/drawingml/2006/main" xmlns:r="http://schemas.openxmlformats.org/officeDocument/2006/relationships" xmlns:p="http://schemas.openxmlformats.org/presentationml/2006/main">
+<p:sld xmlns:a="http://schemas.openxmlformats.org/drawingml/2006/main" xmlns:r="http://schemas.openxmlformats.org/officeDocument/2006/relationships" xmlns:p="http://schemas.openxmlformats.org/presentationml/2006/main" showMasterSp="0">
   <p:cSld>
     <p:spTree>
       <p:nvGrpSpPr>
@@ -12392,7 +13808,7 @@
 </file>
 
 <file path=ppt/slides/slide6.xml><?xml version="1.0" encoding="utf-8"?>
-<p:sld xmlns:a="http://schemas.openxmlformats.org/drawingml/2006/main" xmlns:r="http://schemas.openxmlformats.org/officeDocument/2006/relationships" xmlns:p="http://schemas.openxmlformats.org/presentationml/2006/main">
+<p:sld xmlns:a="http://schemas.openxmlformats.org/drawingml/2006/main" xmlns:r="http://schemas.openxmlformats.org/officeDocument/2006/relationships" xmlns:p="http://schemas.openxmlformats.org/presentationml/2006/main" showMasterSp="0">
   <p:cSld>
     <p:spTree>
       <p:nvGrpSpPr>
@@ -12625,7 +14041,7 @@
 </file>
 
 <file path=ppt/slides/slide7.xml><?xml version="1.0" encoding="utf-8"?>
-<p:sld xmlns:a="http://schemas.openxmlformats.org/drawingml/2006/main" xmlns:r="http://schemas.openxmlformats.org/officeDocument/2006/relationships" xmlns:p="http://schemas.openxmlformats.org/presentationml/2006/main">
+<p:sld xmlns:a="http://schemas.openxmlformats.org/drawingml/2006/main" xmlns:r="http://schemas.openxmlformats.org/officeDocument/2006/relationships" xmlns:p="http://schemas.openxmlformats.org/presentationml/2006/main" showMasterSp="0">
   <p:cSld>
     <p:spTree>
       <p:nvGrpSpPr>
@@ -12842,7 +14258,7 @@
 </file>
 
 <file path=ppt/slides/slide8.xml><?xml version="1.0" encoding="utf-8"?>
-<p:sld xmlns:a="http://schemas.openxmlformats.org/drawingml/2006/main" xmlns:r="http://schemas.openxmlformats.org/officeDocument/2006/relationships" xmlns:p="http://schemas.openxmlformats.org/presentationml/2006/main">
+<p:sld xmlns:a="http://schemas.openxmlformats.org/drawingml/2006/main" xmlns:r="http://schemas.openxmlformats.org/officeDocument/2006/relationships" xmlns:p="http://schemas.openxmlformats.org/presentationml/2006/main" showMasterSp="0">
   <p:cSld>
     <p:spTree>
       <p:nvGrpSpPr>
@@ -13059,7 +14475,7 @@
 </file>
 
 <file path=ppt/slides/slide9.xml><?xml version="1.0" encoding="utf-8"?>
-<p:sld xmlns:a="http://schemas.openxmlformats.org/drawingml/2006/main" xmlns:r="http://schemas.openxmlformats.org/officeDocument/2006/relationships" xmlns:p="http://schemas.openxmlformats.org/presentationml/2006/main">
+<p:sld xmlns:a="http://schemas.openxmlformats.org/drawingml/2006/main" xmlns:r="http://schemas.openxmlformats.org/officeDocument/2006/relationships" xmlns:p="http://schemas.openxmlformats.org/presentationml/2006/main" showMasterSp="0">
   <p:cSld>
     <p:spTree>
       <p:nvGrpSpPr>

</xml_diff>